<commit_message>
Add link to -v12 in comments
</commit_message>
<xml_diff>
--- a/slides/slides-ietf113-alto-performance-metrics-v1.pptx
+++ b/slides/slides-ietf113-alto-performance-metrics-v1.pptx
@@ -567,10 +567,10 @@
           </a:ln>
           <a:extLst>
             <a:ext uri="{FAA26D3D-D897-4be2-8F04-BA451C77F1D7}">
-              <ma14:placeholderFlag xmlns="" xmlns:ma14="http://schemas.microsoft.com/office/mac/drawingml/2011/main" val="1"/>
+              <ma14:placeholderFlag xmlns:ma14="http://schemas.microsoft.com/office/mac/drawingml/2011/main" xmlns="" val="1"/>
             </a:ext>
             <a:ext uri="{909E8E84-426E-40dd-AFC4-6F175D3DCCD1}">
-              <a14:hiddenFill xmlns:a14="http://schemas.microsoft.com/office/drawing/2010/main" xmlns="">
+              <a14:hiddenFill xmlns="" xmlns:a14="http://schemas.microsoft.com/office/drawing/2010/main">
                 <a:solidFill>
                   <a:srgbClr val="FFFFFF"/>
                 </a:solidFill>
@@ -1180,6 +1180,115 @@
 </p:notes>
 </file>
 
+<file path=ppt/notesSlides/notesSlide4.xml><?xml version="1.0" encoding="utf-8"?>
+<p:notes xmlns:a="http://schemas.openxmlformats.org/drawingml/2006/main" xmlns:r="http://schemas.openxmlformats.org/officeDocument/2006/relationships" xmlns:p="http://schemas.openxmlformats.org/presentationml/2006/main">
+  <p:cSld>
+    <p:spTree>
+      <p:nvGrpSpPr>
+        <p:cNvPr id="1" name=""/>
+        <p:cNvGrpSpPr/>
+        <p:nvPr/>
+      </p:nvGrpSpPr>
+      <p:grpSpPr>
+        <a:xfrm>
+          <a:off x="0" y="0"/>
+          <a:ext cx="0" cy="0"/>
+          <a:chOff x="0" y="0"/>
+          <a:chExt cx="0" cy="0"/>
+        </a:xfrm>
+      </p:grpSpPr>
+      <p:sp>
+        <p:nvSpPr>
+          <p:cNvPr id="2" name="Slide Image Placeholder 1"/>
+          <p:cNvSpPr>
+            <a:spLocks noGrp="1" noRot="1" noChangeAspect="1"/>
+          </p:cNvSpPr>
+          <p:nvPr>
+            <p:ph type="sldImg"/>
+          </p:nvPr>
+        </p:nvSpPr>
+        <p:spPr/>
+      </p:sp>
+      <p:sp>
+        <p:nvSpPr>
+          <p:cNvPr id="3" name="Notes Placeholder 2"/>
+          <p:cNvSpPr>
+            <a:spLocks noGrp="1"/>
+          </p:cNvSpPr>
+          <p:nvPr>
+            <p:ph type="body" idx="1"/>
+          </p:nvPr>
+        </p:nvSpPr>
+        <p:spPr/>
+        <p:txBody>
+          <a:bodyPr/>
+          <a:lstStyle/>
+          <a:p>
+            <a:r>
+              <a:rPr lang="en-US" dirty="0"/>
+              <a:t>https://</a:t>
+            </a:r>
+            <a:r>
+              <a:rPr lang="en-US" dirty="0" err="1"/>
+              <a:t>datatracker.ietf.org</a:t>
+            </a:r>
+            <a:r>
+              <a:rPr lang="en-US" dirty="0"/>
+              <a:t>/doc/draft-</a:t>
+            </a:r>
+            <a:r>
+              <a:rPr lang="en-US" dirty="0" err="1"/>
+              <a:t>ietf</a:t>
+            </a:r>
+            <a:r>
+              <a:rPr lang="en-US"/>
+              <a:t>-alto-performance-metrics/21/</a:t>
+            </a:r>
+          </a:p>
+        </p:txBody>
+      </p:sp>
+      <p:sp>
+        <p:nvSpPr>
+          <p:cNvPr id="4" name="Slide Number Placeholder 3"/>
+          <p:cNvSpPr>
+            <a:spLocks noGrp="1"/>
+          </p:cNvSpPr>
+          <p:nvPr>
+            <p:ph type="sldNum" sz="quarter" idx="5"/>
+          </p:nvPr>
+        </p:nvSpPr>
+        <p:spPr/>
+        <p:txBody>
+          <a:bodyPr/>
+          <a:lstStyle/>
+          <a:p>
+            <a:pPr>
+              <a:defRPr/>
+            </a:pPr>
+            <a:fld id="{86487906-38C7-2948-8EF2-63BA3985CDFF}" type="slidenum">
+              <a:rPr lang="en-US" smtClean="0"/>
+              <a:pPr>
+                <a:defRPr/>
+              </a:pPr>
+              <a:t>9</a:t>
+            </a:fld>
+            <a:endParaRPr lang="en-US"/>
+          </a:p>
+        </p:txBody>
+      </p:sp>
+    </p:spTree>
+    <p:extLst>
+      <p:ext uri="{BB962C8B-B14F-4D97-AF65-F5344CB8AC3E}">
+        <p14:creationId xmlns:p14="http://schemas.microsoft.com/office/powerpoint/2010/main" val="1145224499"/>
+      </p:ext>
+    </p:extLst>
+  </p:cSld>
+  <p:clrMapOvr>
+    <a:masterClrMapping/>
+  </p:clrMapOvr>
+</p:notes>
+</file>
+
 <file path=ppt/slideLayouts/slideLayout1.xml><?xml version="1.0" encoding="utf-8"?>
 <p:sldLayout xmlns:a="http://schemas.openxmlformats.org/drawingml/2006/main" xmlns:r="http://schemas.openxmlformats.org/officeDocument/2006/relationships" xmlns:p="http://schemas.openxmlformats.org/presentationml/2006/main" type="title" preserve="1">
   <p:cSld name="Title Slide">
@@ -2952,17 +3061,17 @@
           </a:ln>
           <a:extLst>
             <a:ext uri="{FAA26D3D-D897-4be2-8F04-BA451C77F1D7}">
-              <ma14:placeholderFlag xmlns="" xmlns:ma14="http://schemas.microsoft.com/office/mac/drawingml/2011/main" val="1"/>
+              <ma14:placeholderFlag xmlns:ma14="http://schemas.microsoft.com/office/mac/drawingml/2011/main" xmlns="" val="1"/>
             </a:ext>
             <a:ext uri="{909E8E84-426E-40dd-AFC4-6F175D3DCCD1}">
-              <a14:hiddenFill xmlns:a14="http://schemas.microsoft.com/office/drawing/2010/main" xmlns="">
+              <a14:hiddenFill xmlns="" xmlns:a14="http://schemas.microsoft.com/office/drawing/2010/main">
                 <a:solidFill>
                   <a:srgbClr val="FFFFFF"/>
                 </a:solidFill>
               </a14:hiddenFill>
             </a:ext>
             <a:ext uri="{91240B29-F687-4f45-9708-019B960494DF}">
-              <a14:hiddenLine xmlns:a14="http://schemas.microsoft.com/office/drawing/2010/main" xmlns="" w="9525">
+              <a14:hiddenLine xmlns="" xmlns:a14="http://schemas.microsoft.com/office/drawing/2010/main" w="9525">
                 <a:solidFill>
                   <a:srgbClr val="000000"/>
                 </a:solidFill>
@@ -3044,7 +3153,7 @@
           </a:ln>
           <a:extLst>
             <a:ext uri="{909E8E84-426E-40dd-AFC4-6F175D3DCCD1}">
-              <a14:hiddenFill xmlns:a14="http://schemas.microsoft.com/office/drawing/2010/main" xmlns="">
+              <a14:hiddenFill xmlns="" xmlns:a14="http://schemas.microsoft.com/office/drawing/2010/main">
                 <a:noFill/>
               </a14:hiddenFill>
             </a:ext>
@@ -5239,7 +5348,7 @@
           <p:nvPr/>
         </p:nvPicPr>
         <p:blipFill>
-          <a:blip r:embed="rId2"/>
+          <a:blip r:embed="rId3"/>
           <a:stretch>
             <a:fillRect/>
           </a:stretch>

</xml_diff>